<commit_message>
DB updated w/ Shuo grid
</commit_message>
<xml_diff>
--- a/ETL_Project_Presentation01.2020.pptx
+++ b/ETL_Project_Presentation01.2020.pptx
@@ -3184,7 +3184,7 @@
           <a:p>
             <a:fld id="{9184DA70-C731-4C70-880D-CCD4705E623C}" type="datetime1">
               <a:rPr lang="en-US" smtClean="0"/>
-              <a:t>1/29/20</a:t>
+              <a:t>1/30/20</a:t>
             </a:fld>
             <a:endParaRPr lang="en-US" dirty="0"/>
           </a:p>
@@ -3382,7 +3382,7 @@
           <a:p>
             <a:fld id="{B612A279-0833-481D-8C56-F67FD0AC6C50}" type="datetime1">
               <a:rPr lang="en-US" smtClean="0"/>
-              <a:t>1/29/20</a:t>
+              <a:t>1/30/20</a:t>
             </a:fld>
             <a:endParaRPr lang="en-US" dirty="0"/>
           </a:p>
@@ -3590,7 +3590,7 @@
           <a:p>
             <a:fld id="{6587DA83-5663-4C9C-B9AA-0B40A3DAFF81}" type="datetime1">
               <a:rPr lang="en-US" smtClean="0"/>
-              <a:t>1/29/20</a:t>
+              <a:t>1/30/20</a:t>
             </a:fld>
             <a:endParaRPr lang="en-US" dirty="0"/>
           </a:p>
@@ -3788,7 +3788,7 @@
           <a:p>
             <a:fld id="{4BE1D723-8F53-4F53-90B0-1982A396982E}" type="datetime1">
               <a:rPr lang="en-US" smtClean="0"/>
-              <a:t>1/29/20</a:t>
+              <a:t>1/30/20</a:t>
             </a:fld>
             <a:endParaRPr lang="en-US" dirty="0"/>
           </a:p>
@@ -4063,7 +4063,7 @@
           <a:p>
             <a:fld id="{97669AF7-7BEB-44E4-9852-375E34362B5B}" type="datetime1">
               <a:rPr lang="en-US" smtClean="0"/>
-              <a:t>1/29/20</a:t>
+              <a:t>1/30/20</a:t>
             </a:fld>
             <a:endParaRPr lang="en-US" dirty="0"/>
           </a:p>
@@ -4328,7 +4328,7 @@
           <a:p>
             <a:fld id="{BAAAC38D-0552-4C82-B593-E6124DFADBE2}" type="datetime1">
               <a:rPr lang="en-US" smtClean="0"/>
-              <a:t>1/29/20</a:t>
+              <a:t>1/30/20</a:t>
             </a:fld>
             <a:endParaRPr lang="en-US" dirty="0"/>
           </a:p>
@@ -4740,7 +4740,7 @@
           <a:p>
             <a:fld id="{D9DF0F1C-5577-4ACB-BB62-DF8F3C494C7E}" type="datetime1">
               <a:rPr lang="en-US" smtClean="0"/>
-              <a:t>1/29/20</a:t>
+              <a:t>1/30/20</a:t>
             </a:fld>
             <a:endParaRPr lang="en-US" dirty="0"/>
           </a:p>
@@ -4881,7 +4881,7 @@
           <a:p>
             <a:fld id="{1775B394-D9F9-4F0C-B15D-605F45CB9E9F}" type="datetime1">
               <a:rPr lang="en-US" smtClean="0"/>
-              <a:t>1/29/20</a:t>
+              <a:t>1/30/20</a:t>
             </a:fld>
             <a:endParaRPr lang="en-US" dirty="0"/>
           </a:p>
@@ -4994,7 +4994,7 @@
           <a:p>
             <a:fld id="{39667345-2558-425A-8533-9BFDBCE15005}" type="datetime1">
               <a:rPr lang="en-US" smtClean="0"/>
-              <a:t>1/29/20</a:t>
+              <a:t>1/30/20</a:t>
             </a:fld>
             <a:endParaRPr lang="en-US" dirty="0"/>
           </a:p>
@@ -5305,7 +5305,7 @@
           <a:p>
             <a:fld id="{92BEA474-078D-4E9B-9B14-09A87B19DC46}" type="datetime1">
               <a:rPr lang="en-US" smtClean="0"/>
-              <a:t>1/29/20</a:t>
+              <a:t>1/30/20</a:t>
             </a:fld>
             <a:endParaRPr lang="en-US" dirty="0"/>
           </a:p>
@@ -5594,7 +5594,7 @@
           <a:p>
             <a:fld id="{4907D986-8816-4272-A432-0437A28A9828}" type="datetime1">
               <a:rPr lang="en-US" smtClean="0"/>
-              <a:t>1/29/20</a:t>
+              <a:t>1/30/20</a:t>
             </a:fld>
             <a:endParaRPr lang="en-US" dirty="0"/>
           </a:p>
@@ -5836,7 +5836,7 @@
           <a:p>
             <a:fld id="{62D6E202-B606-4609-B914-27C9371A1F6D}" type="datetime1">
               <a:rPr lang="en-US" smtClean="0"/>
-              <a:t>1/29/20</a:t>
+              <a:t>1/30/20</a:t>
             </a:fld>
             <a:endParaRPr lang="en-US" dirty="0"/>
           </a:p>
@@ -7231,7 +7231,7 @@
           <p:nvPr>
             <p:extLst>
               <p:ext uri="{D42A27DB-BD31-4B8C-83A1-F6EECF244321}">
-                <p14:modId xmlns:p14="http://schemas.microsoft.com/office/powerpoint/2010/main" val="1976604001"/>
+                <p14:modId xmlns:p14="http://schemas.microsoft.com/office/powerpoint/2010/main" val="1600937807"/>
               </p:ext>
             </p:extLst>
           </p:nvPr>
@@ -7814,10 +7814,10 @@
                     <a:p>
                       <a:pPr algn="r" fontAlgn="ctr"/>
                       <a:r>
-                        <a:rPr lang="en-US">
+                        <a:rPr lang="en-US" dirty="0">
                           <a:effectLst/>
                         </a:rPr>
-                        <a:t>6594</a:t>
+                        <a:t>6,594</a:t>
                       </a:r>
                     </a:p>
                   </a:txBody>
@@ -7888,7 +7888,7 @@
                         <a:rPr lang="en-US" dirty="0">
                           <a:effectLst/>
                         </a:rPr>
-                        <a:t>8403</a:t>
+                        <a:t>4,698</a:t>
                       </a:r>
                     </a:p>
                   </a:txBody>

</xml_diff>